<commit_message>
adding new filter echo
</commit_message>
<xml_diff>
--- a/doc/sound_Analysis/Equilizer.pptx
+++ b/doc/sound_Analysis/Equilizer.pptx
@@ -10,6 +10,8 @@
     <p:sldId id="259" r:id="rId4"/>
     <p:sldId id="256" r:id="rId5"/>
     <p:sldId id="260" r:id="rId6"/>
+    <p:sldId id="261" r:id="rId7"/>
+    <p:sldId id="262" r:id="rId8"/>
   </p:sldIdLst>
   <p:sldSz cx="9144000" cy="6858000" type="screen4x3"/>
   <p:notesSz cx="6858000" cy="9144000"/>
@@ -293,7 +295,7 @@
             <a:fld id="{AA309A6D-C09C-4548-B29A-6CF363A7E532}" type="datetimeFigureOut">
               <a:rPr lang="fr-FR" smtClean="0"/>
               <a:pPr/>
-              <a:t>16/05/2015</a:t>
+              <a:t>23/05/2015</a:t>
             </a:fld>
             <a:endParaRPr lang="fr-BE"/>
           </a:p>
@@ -460,7 +462,7 @@
             <a:fld id="{AA309A6D-C09C-4548-B29A-6CF363A7E532}" type="datetimeFigureOut">
               <a:rPr lang="fr-FR" smtClean="0"/>
               <a:pPr/>
-              <a:t>16/05/2015</a:t>
+              <a:t>23/05/2015</a:t>
             </a:fld>
             <a:endParaRPr lang="fr-BE"/>
           </a:p>
@@ -637,7 +639,7 @@
             <a:fld id="{AA309A6D-C09C-4548-B29A-6CF363A7E532}" type="datetimeFigureOut">
               <a:rPr lang="fr-FR" smtClean="0"/>
               <a:pPr/>
-              <a:t>16/05/2015</a:t>
+              <a:t>23/05/2015</a:t>
             </a:fld>
             <a:endParaRPr lang="fr-BE"/>
           </a:p>
@@ -804,7 +806,7 @@
             <a:fld id="{AA309A6D-C09C-4548-B29A-6CF363A7E532}" type="datetimeFigureOut">
               <a:rPr lang="fr-FR" smtClean="0"/>
               <a:pPr/>
-              <a:t>16/05/2015</a:t>
+              <a:t>23/05/2015</a:t>
             </a:fld>
             <a:endParaRPr lang="fr-BE"/>
           </a:p>
@@ -1047,7 +1049,7 @@
             <a:fld id="{AA309A6D-C09C-4548-B29A-6CF363A7E532}" type="datetimeFigureOut">
               <a:rPr lang="fr-FR" smtClean="0"/>
               <a:pPr/>
-              <a:t>16/05/2015</a:t>
+              <a:t>23/05/2015</a:t>
             </a:fld>
             <a:endParaRPr lang="fr-BE"/>
           </a:p>
@@ -1332,7 +1334,7 @@
             <a:fld id="{AA309A6D-C09C-4548-B29A-6CF363A7E532}" type="datetimeFigureOut">
               <a:rPr lang="fr-FR" smtClean="0"/>
               <a:pPr/>
-              <a:t>16/05/2015</a:t>
+              <a:t>23/05/2015</a:t>
             </a:fld>
             <a:endParaRPr lang="fr-BE"/>
           </a:p>
@@ -1751,7 +1753,7 @@
             <a:fld id="{AA309A6D-C09C-4548-B29A-6CF363A7E532}" type="datetimeFigureOut">
               <a:rPr lang="fr-FR" smtClean="0"/>
               <a:pPr/>
-              <a:t>16/05/2015</a:t>
+              <a:t>23/05/2015</a:t>
             </a:fld>
             <a:endParaRPr lang="fr-BE"/>
           </a:p>
@@ -1866,7 +1868,7 @@
             <a:fld id="{AA309A6D-C09C-4548-B29A-6CF363A7E532}" type="datetimeFigureOut">
               <a:rPr lang="fr-FR" smtClean="0"/>
               <a:pPr/>
-              <a:t>16/05/2015</a:t>
+              <a:t>23/05/2015</a:t>
             </a:fld>
             <a:endParaRPr lang="fr-BE"/>
           </a:p>
@@ -1958,7 +1960,7 @@
             <a:fld id="{AA309A6D-C09C-4548-B29A-6CF363A7E532}" type="datetimeFigureOut">
               <a:rPr lang="fr-FR" smtClean="0"/>
               <a:pPr/>
-              <a:t>16/05/2015</a:t>
+              <a:t>23/05/2015</a:t>
             </a:fld>
             <a:endParaRPr lang="fr-BE"/>
           </a:p>
@@ -2232,7 +2234,7 @@
             <a:fld id="{AA309A6D-C09C-4548-B29A-6CF363A7E532}" type="datetimeFigureOut">
               <a:rPr lang="fr-FR" smtClean="0"/>
               <a:pPr/>
-              <a:t>16/05/2015</a:t>
+              <a:t>23/05/2015</a:t>
             </a:fld>
             <a:endParaRPr lang="fr-BE"/>
           </a:p>
@@ -2482,7 +2484,7 @@
             <a:fld id="{AA309A6D-C09C-4548-B29A-6CF363A7E532}" type="datetimeFigureOut">
               <a:rPr lang="fr-FR" smtClean="0"/>
               <a:pPr/>
-              <a:t>16/05/2015</a:t>
+              <a:t>23/05/2015</a:t>
             </a:fld>
             <a:endParaRPr lang="fr-BE"/>
           </a:p>
@@ -2692,7 +2694,7 @@
             <a:fld id="{AA309A6D-C09C-4548-B29A-6CF363A7E532}" type="datetimeFigureOut">
               <a:rPr lang="fr-FR" smtClean="0"/>
               <a:pPr/>
-              <a:t>16/05/2015</a:t>
+              <a:t>23/05/2015</a:t>
             </a:fld>
             <a:endParaRPr lang="fr-BE"/>
           </a:p>
@@ -3134,17 +3136,8 @@
             </a:pPr>
             <a:r>
               <a:rPr lang="en-US" dirty="0" smtClean="0"/>
-              <a:t>FFT </a:t>
-            </a:r>
-            <a:r>
-              <a:rPr lang="en-US" dirty="0" smtClean="0"/>
-              <a:t>Depth at </a:t>
-            </a:r>
-            <a:r>
-              <a:rPr lang="en-US" dirty="0" smtClean="0"/>
-              <a:t>16384(2^14) </a:t>
-            </a:r>
-            <a:endParaRPr lang="en-US" dirty="0" smtClean="0"/>
+              <a:t>FFT Depth at 16384(2^14) </a:t>
+            </a:r>
           </a:p>
           <a:p>
             <a:pPr>
@@ -3153,17 +3146,8 @@
             </a:pPr>
             <a:r>
               <a:rPr lang="en-US" dirty="0" smtClean="0"/>
-              <a:t>16 </a:t>
-            </a:r>
-            <a:r>
-              <a:rPr lang="en-US" dirty="0" smtClean="0"/>
-              <a:t>bars </a:t>
-            </a:r>
-            <a:r>
-              <a:rPr lang="en-US" dirty="0" smtClean="0"/>
-              <a:t>from 20 to 20kHz</a:t>
-            </a:r>
-            <a:endParaRPr lang="en-US" dirty="0" smtClean="0"/>
+              <a:t>16 bars from 20 to 20kHz</a:t>
+            </a:r>
           </a:p>
           <a:p>
             <a:pPr>
@@ -3174,7 +3158,6 @@
               <a:rPr lang="en-US" dirty="0" smtClean="0"/>
               <a:t>Fs=48kHz</a:t>
             </a:r>
-            <a:endParaRPr lang="en-US" dirty="0" smtClean="0"/>
           </a:p>
           <a:p>
             <a:pPr>
@@ -3213,11 +3196,7 @@
           <a:p>
             <a:r>
               <a:rPr lang="en-US" dirty="0" smtClean="0"/>
-              <a:t> </a:t>
-            </a:r>
-            <a:r>
-              <a:rPr lang="en-US" dirty="0" smtClean="0"/>
-              <a:t>it generates a frame also every 341 ms, which is 3 FPS, and visually wasn’t good looking.</a:t>
+              <a:t> it generates a frame also every 341 ms, which is 3 FPS, and visually wasn’t good looking.</a:t>
             </a:r>
           </a:p>
           <a:p>
@@ -3387,28 +3366,18 @@
               <a:rPr lang="en-US" sz="1800" dirty="0" smtClean="0"/>
               <a:t>New Stats:</a:t>
             </a:r>
-            <a:endParaRPr lang="en-US" sz="1800" dirty="0" smtClean="0"/>
           </a:p>
           <a:p>
             <a:r>
               <a:rPr lang="en-US" sz="1800" dirty="0" smtClean="0"/>
-              <a:t>FFT </a:t>
-            </a:r>
+              <a:t>FFT Depth at 8192 (2^13) </a:t>
+            </a:r>
+          </a:p>
+          <a:p>
             <a:r>
               <a:rPr lang="en-US" sz="1800" dirty="0" smtClean="0"/>
-              <a:t>Depth at 8192 (2^13) </a:t>
-            </a:r>
-          </a:p>
-          <a:p>
-            <a:r>
-              <a:rPr lang="en-US" sz="1800" dirty="0" smtClean="0"/>
-              <a:t>22 </a:t>
-            </a:r>
-            <a:r>
-              <a:rPr lang="en-US" sz="1800" dirty="0" smtClean="0"/>
-              <a:t>bars for more granularity </a:t>
-            </a:r>
-            <a:endParaRPr lang="en-US" sz="1800" dirty="0" smtClean="0"/>
+              <a:t>22 bars for more granularity </a:t>
+            </a:r>
           </a:p>
           <a:p>
             <a:r>
@@ -3429,23 +3398,7 @@
             </a:pPr>
             <a:r>
               <a:rPr lang="en-US" sz="1800" dirty="0" smtClean="0"/>
-              <a:t>A </a:t>
-            </a:r>
-            <a:r>
-              <a:rPr lang="en-US" sz="1800" dirty="0" smtClean="0"/>
-              <a:t>frame is </a:t>
-            </a:r>
-            <a:r>
-              <a:rPr lang="en-US" sz="1800" dirty="0" smtClean="0"/>
-              <a:t>then generated </a:t>
-            </a:r>
-            <a:r>
-              <a:rPr lang="en-US" sz="1800" dirty="0" smtClean="0"/>
-              <a:t>every 85ms, </a:t>
-            </a:r>
-            <a:r>
-              <a:rPr lang="en-US" sz="1800" dirty="0" smtClean="0"/>
-              <a:t> which makes 11 FPS, visually acceptable, same for the input lag.</a:t>
+              <a:t>A frame is then generated every 85ms,  which makes 11 FPS, visually acceptable, same for the input lag.</a:t>
             </a:r>
           </a:p>
           <a:p>
@@ -3479,7 +3432,6 @@
               <a:rPr lang="en-US" sz="1800" dirty="0" smtClean="0"/>
               <a:t>The number of bars are increased to 22, for more granularity. </a:t>
             </a:r>
-            <a:endParaRPr lang="en-US" sz="1800" dirty="0" smtClean="0"/>
           </a:p>
           <a:p>
             <a:endParaRPr lang="fr-CH" sz="1800" dirty="0"/>
@@ -5099,11 +5051,7 @@
             </a:r>
             <a:r>
               <a:rPr lang="fr-CH" dirty="0" smtClean="0"/>
-              <a:t> the Bars </a:t>
-            </a:r>
-            <a:r>
-              <a:rPr lang="fr-CH" dirty="0" smtClean="0"/>
-              <a:t>amplifications</a:t>
+              <a:t> the Bars amplifications</a:t>
             </a:r>
             <a:endParaRPr lang="fr-CH" dirty="0"/>
           </a:p>
@@ -5787,7 +5735,7 @@
                     <a:p>
                       <a:pPr algn="r" fontAlgn="b"/>
                       <a:r>
-                        <a:rPr lang="fr-CH" sz="1000" b="0" i="0" u="none" strike="noStrike">
+                        <a:rPr lang="fr-CH" sz="1000" b="0" i="0" u="none" strike="noStrike" dirty="0">
                           <a:solidFill>
                             <a:srgbClr val="000000"/>
                           </a:solidFill>
@@ -7398,6 +7346,286 @@
           </a:graphicData>
         </a:graphic>
       </p:graphicFrame>
+    </p:spTree>
+  </p:cSld>
+  <p:clrMapOvr>
+    <a:masterClrMapping/>
+  </p:clrMapOvr>
+</p:sld>
+</file>
+
+<file path=ppt/slides/slide6.xml><?xml version="1.0" encoding="utf-8"?>
+<p:sld xmlns:a="http://schemas.openxmlformats.org/drawingml/2006/main" xmlns:r="http://schemas.openxmlformats.org/officeDocument/2006/relationships" xmlns:p="http://schemas.openxmlformats.org/presentationml/2006/main">
+  <p:cSld>
+    <p:spTree>
+      <p:nvGrpSpPr>
+        <p:cNvPr id="1" name=""/>
+        <p:cNvGrpSpPr/>
+        <p:nvPr/>
+      </p:nvGrpSpPr>
+      <p:grpSpPr>
+        <a:xfrm>
+          <a:off x="0" y="0"/>
+          <a:ext cx="0" cy="0"/>
+          <a:chOff x="0" y="0"/>
+          <a:chExt cx="0" cy="0"/>
+        </a:xfrm>
+      </p:grpSpPr>
+      <p:sp>
+        <p:nvSpPr>
+          <p:cNvPr id="2" name="Titre 1"/>
+          <p:cNvSpPr>
+            <a:spLocks noGrp="1"/>
+          </p:cNvSpPr>
+          <p:nvPr>
+            <p:ph type="title"/>
+          </p:nvPr>
+        </p:nvSpPr>
+        <p:spPr/>
+        <p:txBody>
+          <a:bodyPr/>
+          <a:lstStyle/>
+          <a:p>
+            <a:r>
+              <a:rPr lang="fr-CH" dirty="0" smtClean="0"/>
+              <a:t>Scope </a:t>
+            </a:r>
+            <a:r>
+              <a:rPr lang="fr-CH" dirty="0" err="1" smtClean="0"/>
+              <a:t>visualization</a:t>
+            </a:r>
+            <a:endParaRPr lang="fr-CH" dirty="0"/>
+          </a:p>
+        </p:txBody>
+      </p:sp>
+      <p:sp>
+        <p:nvSpPr>
+          <p:cNvPr id="3" name="Espace réservé du contenu 2"/>
+          <p:cNvSpPr>
+            <a:spLocks noGrp="1"/>
+          </p:cNvSpPr>
+          <p:nvPr>
+            <p:ph idx="1"/>
+          </p:nvPr>
+        </p:nvSpPr>
+        <p:spPr/>
+        <p:txBody>
+          <a:bodyPr/>
+          <a:lstStyle/>
+          <a:p>
+            <a:r>
+              <a:rPr lang="fr-CH" dirty="0" smtClean="0"/>
+              <a:t>The scope  uses 2 block Rams to display the </a:t>
+            </a:r>
+            <a:r>
+              <a:rPr lang="fr-CH" dirty="0" err="1" smtClean="0"/>
+              <a:t>sound</a:t>
+            </a:r>
+            <a:r>
+              <a:rPr lang="fr-CH" dirty="0" smtClean="0"/>
+              <a:t> </a:t>
+            </a:r>
+            <a:r>
+              <a:rPr lang="fr-CH" dirty="0" err="1" smtClean="0"/>
+              <a:t>wave</a:t>
+            </a:r>
+            <a:r>
+              <a:rPr lang="fr-CH" dirty="0" smtClean="0"/>
+              <a:t>.</a:t>
+            </a:r>
+          </a:p>
+          <a:p>
+            <a:r>
+              <a:rPr lang="fr-CH" dirty="0" smtClean="0"/>
+              <a:t>The first block Ram </a:t>
+            </a:r>
+            <a:r>
+              <a:rPr lang="fr-CH" dirty="0" err="1" smtClean="0"/>
+              <a:t>is</a:t>
+            </a:r>
+            <a:r>
+              <a:rPr lang="fr-CH" dirty="0" smtClean="0"/>
+              <a:t> </a:t>
+            </a:r>
+            <a:r>
+              <a:rPr lang="fr-CH" dirty="0" err="1" smtClean="0"/>
+              <a:t>constanlty</a:t>
+            </a:r>
+            <a:r>
+              <a:rPr lang="fr-CH" dirty="0" smtClean="0"/>
+              <a:t> </a:t>
+            </a:r>
+            <a:r>
+              <a:rPr lang="fr-CH" dirty="0" err="1" smtClean="0"/>
+              <a:t>updated</a:t>
+            </a:r>
+            <a:r>
+              <a:rPr lang="fr-CH" dirty="0" smtClean="0"/>
+              <a:t> </a:t>
+            </a:r>
+            <a:r>
+              <a:rPr lang="fr-CH" dirty="0" err="1" smtClean="0"/>
+              <a:t>with</a:t>
+            </a:r>
+            <a:r>
+              <a:rPr lang="fr-CH" dirty="0" smtClean="0"/>
+              <a:t> </a:t>
+            </a:r>
+            <a:r>
+              <a:rPr lang="fr-CH" dirty="0" err="1" smtClean="0"/>
+              <a:t>sound</a:t>
+            </a:r>
+            <a:r>
+              <a:rPr lang="fr-CH" dirty="0" smtClean="0"/>
+              <a:t> </a:t>
+            </a:r>
+            <a:r>
+              <a:rPr lang="fr-CH" dirty="0" err="1" smtClean="0"/>
+              <a:t>samples</a:t>
+            </a:r>
+            <a:r>
+              <a:rPr lang="fr-CH" dirty="0" smtClean="0"/>
+              <a:t>. </a:t>
+            </a:r>
+          </a:p>
+          <a:p>
+            <a:r>
+              <a:rPr lang="fr-CH" dirty="0" smtClean="0"/>
+              <a:t>The 2</a:t>
+            </a:r>
+            <a:r>
+              <a:rPr lang="fr-CH" baseline="30000" dirty="0" smtClean="0"/>
+              <a:t>nd</a:t>
+            </a:r>
+            <a:r>
+              <a:rPr lang="fr-CH" dirty="0" smtClean="0"/>
+              <a:t> block ram </a:t>
+            </a:r>
+            <a:r>
+              <a:rPr lang="fr-CH" dirty="0" err="1" smtClean="0"/>
+              <a:t>is</a:t>
+            </a:r>
+            <a:r>
+              <a:rPr lang="fr-CH" dirty="0" smtClean="0"/>
+              <a:t> </a:t>
+            </a:r>
+            <a:r>
+              <a:rPr lang="fr-CH" dirty="0" err="1" smtClean="0"/>
+              <a:t>there</a:t>
+            </a:r>
+            <a:r>
+              <a:rPr lang="fr-CH" dirty="0" smtClean="0"/>
+              <a:t> to have </a:t>
+            </a:r>
+            <a:r>
+              <a:rPr lang="fr-CH" dirty="0" err="1" smtClean="0"/>
+              <a:t>coherent</a:t>
+            </a:r>
+            <a:r>
+              <a:rPr lang="fr-CH" dirty="0" smtClean="0"/>
+              <a:t> information </a:t>
+            </a:r>
+            <a:r>
+              <a:rPr lang="fr-CH" dirty="0" err="1" smtClean="0"/>
+              <a:t>through</a:t>
+            </a:r>
+            <a:r>
+              <a:rPr lang="fr-CH" dirty="0" smtClean="0"/>
+              <a:t> a single frame </a:t>
+            </a:r>
+            <a:r>
+              <a:rPr lang="fr-CH" dirty="0" err="1" smtClean="0"/>
+              <a:t>when</a:t>
+            </a:r>
+            <a:r>
+              <a:rPr lang="fr-CH" dirty="0" smtClean="0"/>
+              <a:t> </a:t>
+            </a:r>
+            <a:r>
+              <a:rPr lang="fr-CH" dirty="0" err="1" smtClean="0"/>
+              <a:t>displaying</a:t>
+            </a:r>
+            <a:r>
+              <a:rPr lang="fr-CH" dirty="0" smtClean="0"/>
+              <a:t> </a:t>
+            </a:r>
+            <a:r>
+              <a:rPr lang="fr-CH" dirty="0" err="1" smtClean="0"/>
+              <a:t>it</a:t>
+            </a:r>
+            <a:r>
+              <a:rPr lang="fr-CH" dirty="0" smtClean="0"/>
+              <a:t>.</a:t>
+            </a:r>
+          </a:p>
+          <a:p>
+            <a:endParaRPr lang="fr-CH" dirty="0"/>
+          </a:p>
+        </p:txBody>
+      </p:sp>
+    </p:spTree>
+  </p:cSld>
+  <p:clrMapOvr>
+    <a:masterClrMapping/>
+  </p:clrMapOvr>
+</p:sld>
+</file>
+
+<file path=ppt/slides/slide7.xml><?xml version="1.0" encoding="utf-8"?>
+<p:sld xmlns:a="http://schemas.openxmlformats.org/drawingml/2006/main" xmlns:r="http://schemas.openxmlformats.org/officeDocument/2006/relationships" xmlns:p="http://schemas.openxmlformats.org/presentationml/2006/main">
+  <p:cSld>
+    <p:spTree>
+      <p:nvGrpSpPr>
+        <p:cNvPr id="1" name=""/>
+        <p:cNvGrpSpPr/>
+        <p:nvPr/>
+      </p:nvGrpSpPr>
+      <p:grpSpPr>
+        <a:xfrm>
+          <a:off x="0" y="0"/>
+          <a:ext cx="0" cy="0"/>
+          <a:chOff x="0" y="0"/>
+          <a:chExt cx="0" cy="0"/>
+        </a:xfrm>
+      </p:grpSpPr>
+      <p:sp>
+        <p:nvSpPr>
+          <p:cNvPr id="2" name="Titre 1"/>
+          <p:cNvSpPr>
+            <a:spLocks noGrp="1"/>
+          </p:cNvSpPr>
+          <p:nvPr>
+            <p:ph type="title"/>
+          </p:nvPr>
+        </p:nvSpPr>
+        <p:spPr/>
+        <p:txBody>
+          <a:bodyPr/>
+          <a:lstStyle/>
+          <a:p>
+            <a:endParaRPr lang="fr-CH"/>
+          </a:p>
+        </p:txBody>
+      </p:sp>
+      <p:sp>
+        <p:nvSpPr>
+          <p:cNvPr id="3" name="Espace réservé du contenu 2"/>
+          <p:cNvSpPr>
+            <a:spLocks noGrp="1"/>
+          </p:cNvSpPr>
+          <p:nvPr>
+            <p:ph idx="1"/>
+          </p:nvPr>
+        </p:nvSpPr>
+        <p:spPr/>
+        <p:txBody>
+          <a:bodyPr/>
+          <a:lstStyle/>
+          <a:p>
+            <a:endParaRPr lang="fr-CH"/>
+          </a:p>
+        </p:txBody>
+      </p:sp>
     </p:spTree>
   </p:cSld>
   <p:clrMapOvr>

</xml_diff>